<commit_message>
improve PZ and presentation
</commit_message>
<xml_diff>
--- a/pygame_chess_presentation.pptx
+++ b/pygame_chess_presentation.pptx
@@ -5,7 +5,7 @@
     <p:sldMasterId id="2147483659" r:id="rId1"/>
   </p:sldMasterIdLst>
   <p:notesMasterIdLst>
-    <p:notesMasterId r:id="rId9"/>
+    <p:notesMasterId r:id="rId10"/>
   </p:notesMasterIdLst>
   <p:sldIdLst>
     <p:sldId id="256" r:id="rId2"/>
@@ -13,30 +13,24 @@
     <p:sldId id="262" r:id="rId4"/>
     <p:sldId id="258" r:id="rId5"/>
     <p:sldId id="259" r:id="rId6"/>
-    <p:sldId id="260" r:id="rId7"/>
-    <p:sldId id="261" r:id="rId8"/>
+    <p:sldId id="263" r:id="rId7"/>
+    <p:sldId id="260" r:id="rId8"/>
+    <p:sldId id="261" r:id="rId9"/>
   </p:sldIdLst>
   <p:sldSz cx="9144000" cy="5143500" type="screen16x9"/>
   <p:notesSz cx="6858000" cy="9144000"/>
   <p:embeddedFontLst>
     <p:embeddedFont>
       <p:font typeface="Amatic SC" panose="00000500000000000000" pitchFamily="2" charset="-79"/>
-      <p:regular r:id="rId10"/>
-      <p:bold r:id="rId11"/>
-    </p:embeddedFont>
-    <p:embeddedFont>
-      <p:font typeface="Noto Sans" panose="020B0502040504020204" pitchFamily="34" charset="0"/>
-      <p:regular r:id="rId12"/>
-      <p:bold r:id="rId13"/>
-      <p:italic r:id="rId14"/>
-      <p:boldItalic r:id="rId15"/>
+      <p:regular r:id="rId11"/>
+      <p:bold r:id="rId12"/>
     </p:embeddedFont>
     <p:embeddedFont>
       <p:font typeface="Source Code Pro" panose="020B0509030403020204" pitchFamily="49" charset="0"/>
-      <p:regular r:id="rId16"/>
-      <p:bold r:id="rId17"/>
-      <p:italic r:id="rId18"/>
-      <p:boldItalic r:id="rId19"/>
+      <p:regular r:id="rId13"/>
+      <p:bold r:id="rId14"/>
+      <p:italic r:id="rId15"/>
+      <p:boldItalic r:id="rId16"/>
     </p:embeddedFont>
   </p:embeddedFontLst>
   <p:defaultTextStyle>
@@ -1282,7 +1276,7 @@
         </p:nvSpPr>
         <p:spPr>
           <a:xfrm>
-            <a:off x="381300" y="685800"/>
+            <a:off x="381000" y="685800"/>
             <a:ext cx="6096000" cy="3429000"/>
           </a:xfrm>
           <a:custGeom>
@@ -7144,10 +7138,18 @@
               <a:buNone/>
             </a:pPr>
             <a:r>
-              <a:rPr lang="ru"/>
-              <a:t>Создать такие условия, чтобы ничего не останавливало людей от игры в шахматы.</a:t>
+              <a:rPr lang="ru" dirty="0">
+                <a:solidFill>
+                  <a:schemeClr val="accent1"/>
+                </a:solidFill>
+              </a:rPr>
+              <a:t>Создать такие условия, чтобы ничего не останавливало людей от игры в шахматы, независимо от их навыков в этой области</a:t>
             </a:r>
-            <a:endParaRPr dirty="0"/>
+            <a:endParaRPr dirty="0">
+              <a:solidFill>
+                <a:schemeClr val="accent1"/>
+              </a:solidFill>
+            </a:endParaRPr>
           </a:p>
         </p:txBody>
       </p:sp>
@@ -7631,7 +7633,7 @@
         </p:spPr>
         <p:txBody>
           <a:bodyPr spcFirstLastPara="1" wrap="square" lIns="91425" tIns="91425" rIns="91425" bIns="91425" anchor="t" anchorCtr="0">
-            <a:normAutofit/>
+            <a:normAutofit lnSpcReduction="10000"/>
           </a:bodyPr>
           <a:lstStyle/>
           <a:p>
@@ -7747,13 +7749,224 @@
               <a:buNone/>
             </a:pPr>
             <a:r>
+              <a:rPr lang="ru-RU" sz="1500" dirty="0">
+                <a:solidFill>
+                  <a:schemeClr val="accent1"/>
+                </a:solidFill>
+              </a:rPr>
+              <a:t>- </a:t>
+            </a:r>
+            <a:r>
               <a:rPr lang="en-US" sz="1500" dirty="0">
                 <a:solidFill>
                   <a:schemeClr val="accent1"/>
                 </a:solidFill>
               </a:rPr>
-              <a:t>- Class Registration()</a:t>
+              <a:t>Class Registration()</a:t>
             </a:r>
+            <a:endParaRPr lang="ru-RU" sz="1500" dirty="0">
+              <a:solidFill>
+                <a:schemeClr val="accent1"/>
+              </a:solidFill>
+            </a:endParaRPr>
+          </a:p>
+          <a:p>
+            <a:pPr marL="512128" lvl="0" indent="0" algn="just" rtl="0">
+              <a:lnSpc>
+                <a:spcPct val="100000"/>
+              </a:lnSpc>
+              <a:spcBef>
+                <a:spcPts val="600"/>
+              </a:spcBef>
+              <a:spcAft>
+                <a:spcPts val="0"/>
+              </a:spcAft>
+              <a:buClr>
+                <a:srgbClr val="000000"/>
+              </a:buClr>
+              <a:buSzPct val="40000"/>
+              <a:buNone/>
+            </a:pPr>
+            <a:r>
+              <a:rPr lang="en-US" sz="1500" dirty="0">
+                <a:solidFill>
+                  <a:schemeClr val="accent1"/>
+                </a:solidFill>
+              </a:rPr>
+              <a:t>-</a:t>
+            </a:r>
+            <a:r>
+              <a:rPr lang="ru-RU" sz="1500" dirty="0">
+                <a:solidFill>
+                  <a:schemeClr val="accent1"/>
+                </a:solidFill>
+              </a:rPr>
+              <a:t> </a:t>
+            </a:r>
+            <a:r>
+              <a:rPr lang="en-US" sz="1500" dirty="0">
+                <a:solidFill>
+                  <a:schemeClr val="accent1"/>
+                </a:solidFill>
+              </a:rPr>
+              <a:t>Class </a:t>
+            </a:r>
+            <a:r>
+              <a:rPr lang="en-US" sz="1500" dirty="0" err="1">
+                <a:solidFill>
+                  <a:schemeClr val="accent1"/>
+                </a:solidFill>
+              </a:rPr>
+              <a:t>StartScreen</a:t>
+            </a:r>
+            <a:r>
+              <a:rPr lang="en-US" sz="1500" dirty="0">
+                <a:solidFill>
+                  <a:schemeClr val="accent1"/>
+                </a:solidFill>
+              </a:rPr>
+              <a:t>()</a:t>
+            </a:r>
+          </a:p>
+          <a:p>
+            <a:pPr marL="512128" lvl="0" indent="0" algn="just" rtl="0">
+              <a:lnSpc>
+                <a:spcPct val="100000"/>
+              </a:lnSpc>
+              <a:spcBef>
+                <a:spcPts val="600"/>
+              </a:spcBef>
+              <a:spcAft>
+                <a:spcPts val="0"/>
+              </a:spcAft>
+              <a:buClr>
+                <a:srgbClr val="000000"/>
+              </a:buClr>
+              <a:buSzPct val="40000"/>
+              <a:buNone/>
+            </a:pPr>
+            <a:r>
+              <a:rPr lang="en-US" sz="1500" dirty="0">
+                <a:solidFill>
+                  <a:schemeClr val="accent1"/>
+                </a:solidFill>
+              </a:rPr>
+              <a:t>-</a:t>
+            </a:r>
+            <a:r>
+              <a:rPr lang="ru-RU" sz="1500" dirty="0">
+                <a:solidFill>
+                  <a:schemeClr val="accent1"/>
+                </a:solidFill>
+              </a:rPr>
+              <a:t> </a:t>
+            </a:r>
+            <a:r>
+              <a:rPr lang="en-US" sz="1500" dirty="0">
+                <a:solidFill>
+                  <a:schemeClr val="accent1"/>
+                </a:solidFill>
+              </a:rPr>
+              <a:t>Class </a:t>
+            </a:r>
+            <a:r>
+              <a:rPr lang="en-US" sz="1500" dirty="0" err="1">
+                <a:solidFill>
+                  <a:schemeClr val="accent1"/>
+                </a:solidFill>
+              </a:rPr>
+              <a:t>StaticticScreen</a:t>
+            </a:r>
+            <a:r>
+              <a:rPr lang="en-US" sz="1500" dirty="0">
+                <a:solidFill>
+                  <a:schemeClr val="accent1"/>
+                </a:solidFill>
+              </a:rPr>
+              <a:t>()</a:t>
+            </a:r>
+          </a:p>
+          <a:p>
+            <a:pPr marL="512128" lvl="0" indent="0" algn="just" rtl="0">
+              <a:lnSpc>
+                <a:spcPct val="100000"/>
+              </a:lnSpc>
+              <a:spcBef>
+                <a:spcPts val="600"/>
+              </a:spcBef>
+              <a:spcAft>
+                <a:spcPts val="0"/>
+              </a:spcAft>
+              <a:buClr>
+                <a:srgbClr val="000000"/>
+              </a:buClr>
+              <a:buSzPct val="40000"/>
+              <a:buNone/>
+            </a:pPr>
+            <a:r>
+              <a:rPr lang="en-US" sz="1500" dirty="0">
+                <a:solidFill>
+                  <a:schemeClr val="accent1"/>
+                </a:solidFill>
+              </a:rPr>
+              <a:t>-</a:t>
+            </a:r>
+            <a:r>
+              <a:rPr lang="ru-RU" sz="1500" dirty="0">
+                <a:solidFill>
+                  <a:schemeClr val="accent1"/>
+                </a:solidFill>
+              </a:rPr>
+              <a:t> </a:t>
+            </a:r>
+            <a:r>
+              <a:rPr lang="en-US" sz="1500" dirty="0">
+                <a:solidFill>
+                  <a:schemeClr val="accent1"/>
+                </a:solidFill>
+              </a:rPr>
+              <a:t>Class </a:t>
+            </a:r>
+            <a:r>
+              <a:rPr lang="en-US" sz="1500" dirty="0" err="1">
+                <a:solidFill>
+                  <a:schemeClr val="accent1"/>
+                </a:solidFill>
+              </a:rPr>
+              <a:t>InformationForm</a:t>
+            </a:r>
+            <a:r>
+              <a:rPr lang="en-US" sz="1500" dirty="0">
+                <a:solidFill>
+                  <a:schemeClr val="accent1"/>
+                </a:solidFill>
+              </a:rPr>
+              <a:t>()</a:t>
+            </a:r>
+          </a:p>
+          <a:p>
+            <a:pPr marL="797878" lvl="0" indent="-285750" algn="just" rtl="0">
+              <a:lnSpc>
+                <a:spcPct val="100000"/>
+              </a:lnSpc>
+              <a:spcBef>
+                <a:spcPts val="600"/>
+              </a:spcBef>
+              <a:spcAft>
+                <a:spcPts val="0"/>
+              </a:spcAft>
+              <a:buClr>
+                <a:srgbClr val="000000"/>
+              </a:buClr>
+              <a:buSzPct val="40000"/>
+              <a:buFontTx/>
+              <a:buChar char="-"/>
+            </a:pPr>
+            <a:endParaRPr lang="en-US" sz="1500" dirty="0">
+              <a:solidFill>
+                <a:schemeClr val="accent1"/>
+              </a:solidFill>
+            </a:endParaRPr>
           </a:p>
           <a:p>
             <a:pPr marL="0" marR="0" lvl="0" indent="0" algn="just" rtl="0">
@@ -7871,14 +8084,14 @@
               <a:buNone/>
             </a:pPr>
             <a:r>
-              <a:rPr lang="ru">
+              <a:rPr lang="ru" dirty="0">
                 <a:highlight>
                   <a:schemeClr val="lt2"/>
                 </a:highlight>
               </a:rPr>
               <a:t>Описание технологий</a:t>
             </a:r>
-            <a:endParaRPr>
+            <a:endParaRPr dirty="0">
               <a:highlight>
                 <a:schemeClr val="lt2"/>
               </a:highlight>
@@ -7911,202 +8124,136 @@
           </a:bodyPr>
           <a:lstStyle/>
           <a:p>
-            <a:pPr marL="775970" marR="0" lvl="0" indent="-266700" algn="just" rtl="0">
+            <a:pPr marL="342900" lvl="0" indent="-342900" algn="just">
               <a:lnSpc>
-                <a:spcPct val="100000"/>
+                <a:spcPct val="150000"/>
               </a:lnSpc>
-              <a:spcBef>
-                <a:spcPts val="0"/>
-              </a:spcBef>
-              <a:spcAft>
-                <a:spcPts val="0"/>
-              </a:spcAft>
-              <a:buClr>
-                <a:srgbClr val="000000"/>
-              </a:buClr>
-              <a:buSzPts val="600"/>
-              <a:buFont typeface="Noto Sans"/>
-              <a:buChar char="⎯"/>
+              <a:spcAft>
+                <a:spcPts val="1200"/>
+              </a:spcAft>
+              <a:buFont typeface="Symbol" panose="05050102010706020507" pitchFamily="18" charset="2"/>
+              <a:buChar char="-"/>
             </a:pPr>
             <a:r>
-              <a:rPr lang="ru" sz="1500" dirty="0">
+              <a:rPr lang="ru-RU" sz="1600" dirty="0">
                 <a:solidFill>
                   <a:schemeClr val="accent1"/>
                 </a:solidFill>
               </a:rPr>
-              <a:t>Разработка интерфейса средствами QT Designer (авторизация, меню).</a:t>
+              <a:t>Стартовое и финальное окна</a:t>
             </a:r>
-            <a:endParaRPr sz="1500" dirty="0">
+          </a:p>
+          <a:p>
+            <a:pPr marL="342900" lvl="0" indent="-342900" algn="just">
+              <a:lnSpc>
+                <a:spcPct val="150000"/>
+              </a:lnSpc>
+              <a:spcAft>
+                <a:spcPts val="1200"/>
+              </a:spcAft>
+              <a:buFont typeface="Symbol" panose="05050102010706020507" pitchFamily="18" charset="2"/>
+              <a:buChar char="-"/>
+            </a:pPr>
+            <a:r>
+              <a:rPr lang="ru-RU" sz="1600" dirty="0">
+                <a:solidFill>
+                  <a:schemeClr val="accent1"/>
+                </a:solidFill>
+              </a:rPr>
+              <a:t>Подсчет результатов</a:t>
+            </a:r>
+          </a:p>
+          <a:p>
+            <a:pPr marL="342900" lvl="0" indent="-342900" algn="just">
+              <a:lnSpc>
+                <a:spcPct val="150000"/>
+              </a:lnSpc>
+              <a:spcAft>
+                <a:spcPts val="1200"/>
+              </a:spcAft>
+              <a:buFont typeface="Symbol" panose="05050102010706020507" pitchFamily="18" charset="2"/>
+              <a:buChar char="-"/>
+            </a:pPr>
+            <a:r>
+              <a:rPr lang="ru-RU" sz="1600" dirty="0">
+                <a:solidFill>
+                  <a:schemeClr val="accent1"/>
+                </a:solidFill>
+              </a:rPr>
+              <a:t>Спрайты</a:t>
+            </a:r>
+          </a:p>
+          <a:p>
+            <a:pPr marL="342900" lvl="0" indent="-342900" algn="just">
+              <a:lnSpc>
+                <a:spcPct val="150000"/>
+              </a:lnSpc>
+              <a:spcAft>
+                <a:spcPts val="1200"/>
+              </a:spcAft>
+              <a:buFont typeface="Symbol" panose="05050102010706020507" pitchFamily="18" charset="2"/>
+              <a:buChar char="-"/>
+            </a:pPr>
+            <a:r>
+              <a:rPr lang="ru-RU" sz="1600" dirty="0">
+                <a:solidFill>
+                  <a:schemeClr val="accent1"/>
+                </a:solidFill>
+              </a:rPr>
+              <a:t>Анимация</a:t>
+            </a:r>
+          </a:p>
+          <a:p>
+            <a:pPr marL="342900" lvl="0" indent="-342900" algn="just">
+              <a:lnSpc>
+                <a:spcPct val="150000"/>
+              </a:lnSpc>
+              <a:spcAft>
+                <a:spcPts val="1200"/>
+              </a:spcAft>
+              <a:buFont typeface="Symbol" panose="05050102010706020507" pitchFamily="18" charset="2"/>
+              <a:buChar char="-"/>
+            </a:pPr>
+            <a:r>
+              <a:rPr lang="ru-RU" sz="1600" dirty="0">
+                <a:solidFill>
+                  <a:schemeClr val="accent1"/>
+                </a:solidFill>
+              </a:rPr>
+              <a:t>Хранение данных</a:t>
+            </a:r>
+            <a:r>
+              <a:rPr lang="en-US" sz="1600" dirty="0">
+                <a:solidFill>
+                  <a:schemeClr val="accent1"/>
+                </a:solidFill>
+              </a:rPr>
+              <a:t> (.txt, bd)</a:t>
+            </a:r>
+            <a:endParaRPr lang="ru-RU" sz="1600" dirty="0">
               <a:solidFill>
                 <a:schemeClr val="accent1"/>
               </a:solidFill>
             </a:endParaRPr>
           </a:p>
           <a:p>
-            <a:pPr marL="775970" marR="0" lvl="0" indent="-266700" algn="just" rtl="0">
+            <a:pPr marL="342900" lvl="0" indent="-342900" algn="just">
               <a:lnSpc>
-                <a:spcPct val="100000"/>
+                <a:spcPct val="150000"/>
               </a:lnSpc>
-              <a:spcBef>
+              <a:spcAft>
                 <a:spcPts val="1200"/>
-              </a:spcBef>
-              <a:spcAft>
-                <a:spcPts val="0"/>
-              </a:spcAft>
-              <a:buClr>
-                <a:srgbClr val="000000"/>
-              </a:buClr>
-              <a:buSzPts val="600"/>
-              <a:buFont typeface="Noto Sans"/>
-              <a:buChar char="⎯"/>
+              </a:spcAft>
+              <a:buFont typeface="Symbol" panose="05050102010706020507" pitchFamily="18" charset="2"/>
+              <a:buChar char="-"/>
             </a:pPr>
             <a:r>
-              <a:rPr lang="ru-RU" sz="1500" dirty="0">
+              <a:rPr lang="ru-RU" sz="1600" dirty="0">
                 <a:solidFill>
                   <a:schemeClr val="accent1"/>
                 </a:solidFill>
               </a:rPr>
-              <a:t>Стартовое и финальное окна</a:t>
-            </a:r>
-          </a:p>
-          <a:p>
-            <a:pPr marL="775970" marR="0" lvl="0" indent="-266700" algn="just" rtl="0">
-              <a:lnSpc>
-                <a:spcPct val="100000"/>
-              </a:lnSpc>
-              <a:spcBef>
-                <a:spcPts val="1200"/>
-              </a:spcBef>
-              <a:spcAft>
-                <a:spcPts val="0"/>
-              </a:spcAft>
-              <a:buClr>
-                <a:srgbClr val="000000"/>
-              </a:buClr>
-              <a:buSzPts val="600"/>
-              <a:buFont typeface="Noto Sans"/>
-              <a:buChar char="⎯"/>
-            </a:pPr>
-            <a:r>
-              <a:rPr lang="ru-RU" sz="1500" dirty="0">
-                <a:solidFill>
-                  <a:schemeClr val="accent1"/>
-                </a:solidFill>
-              </a:rPr>
-              <a:t>Подсчет результатов</a:t>
-            </a:r>
-          </a:p>
-          <a:p>
-            <a:pPr marL="775970" marR="0" lvl="0" indent="-266700" algn="just" rtl="0">
-              <a:lnSpc>
-                <a:spcPct val="100000"/>
-              </a:lnSpc>
-              <a:spcBef>
-                <a:spcPts val="1200"/>
-              </a:spcBef>
-              <a:spcAft>
-                <a:spcPts val="0"/>
-              </a:spcAft>
-              <a:buClr>
-                <a:srgbClr val="000000"/>
-              </a:buClr>
-              <a:buSzPts val="600"/>
-              <a:buFont typeface="Noto Sans"/>
-              <a:buChar char="⎯"/>
-            </a:pPr>
-            <a:r>
-              <a:rPr lang="ru-RU" sz="1500" dirty="0">
-                <a:solidFill>
-                  <a:schemeClr val="accent1"/>
-                </a:solidFill>
-              </a:rPr>
-              <a:t>Спрайты</a:t>
-            </a:r>
-          </a:p>
-          <a:p>
-            <a:pPr marL="775970" marR="0" lvl="0" indent="-266700" algn="just" rtl="0">
-              <a:lnSpc>
-                <a:spcPct val="100000"/>
-              </a:lnSpc>
-              <a:spcBef>
-                <a:spcPts val="1200"/>
-              </a:spcBef>
-              <a:spcAft>
-                <a:spcPts val="0"/>
-              </a:spcAft>
-              <a:buClr>
-                <a:srgbClr val="000000"/>
-              </a:buClr>
-              <a:buSzPts val="600"/>
-              <a:buFont typeface="Noto Sans"/>
-              <a:buChar char="⎯"/>
-            </a:pPr>
-            <a:r>
-              <a:rPr lang="ru-RU" sz="1500" dirty="0">
-                <a:solidFill>
-                  <a:schemeClr val="accent1"/>
-                </a:solidFill>
-              </a:rPr>
-              <a:t>Анимация</a:t>
-            </a:r>
-          </a:p>
-          <a:p>
-            <a:pPr marL="775970" marR="0" lvl="0" indent="-266700" algn="just" rtl="0">
-              <a:lnSpc>
-                <a:spcPct val="100000"/>
-              </a:lnSpc>
-              <a:spcBef>
-                <a:spcPts val="1200"/>
-              </a:spcBef>
-              <a:spcAft>
-                <a:spcPts val="0"/>
-              </a:spcAft>
-              <a:buClr>
-                <a:srgbClr val="000000"/>
-              </a:buClr>
-              <a:buSzPts val="600"/>
-              <a:buFont typeface="Noto Sans"/>
-              <a:buChar char="⎯"/>
-            </a:pPr>
-            <a:r>
-              <a:rPr lang="ru-RU" sz="1500" dirty="0">
-                <a:solidFill>
-                  <a:schemeClr val="accent1"/>
-                </a:solidFill>
-              </a:rPr>
-              <a:t>Хранение данных (.</a:t>
-            </a:r>
-            <a:r>
-              <a:rPr lang="ru-RU" sz="1500" dirty="0" err="1">
-                <a:solidFill>
-                  <a:schemeClr val="accent1"/>
-                </a:solidFill>
-              </a:rPr>
-              <a:t>txt</a:t>
-            </a:r>
-            <a:r>
-              <a:rPr lang="ru-RU" sz="1500" dirty="0">
-                <a:solidFill>
-                  <a:schemeClr val="accent1"/>
-                </a:solidFill>
-              </a:rPr>
-              <a:t>, </a:t>
-            </a:r>
-            <a:r>
-              <a:rPr lang="ru-RU" sz="1500" dirty="0" err="1">
-                <a:solidFill>
-                  <a:schemeClr val="accent1"/>
-                </a:solidFill>
-              </a:rPr>
-              <a:t>bd</a:t>
-            </a:r>
-            <a:r>
-              <a:rPr lang="ru-RU" sz="1500" dirty="0">
-                <a:solidFill>
-                  <a:schemeClr val="accent1"/>
-                </a:solidFill>
-              </a:rPr>
-              <a:t>)</a:t>
+              <a:t>Несколько уровней (вариантов начальной расстановки)</a:t>
             </a:r>
           </a:p>
           <a:p>
@@ -8132,6 +8279,95 @@
 </file>
 
 <file path=ppt/slides/slide6.xml><?xml version="1.0" encoding="utf-8"?>
+<p:sld xmlns:a="http://schemas.openxmlformats.org/drawingml/2006/main" xmlns:r="http://schemas.openxmlformats.org/officeDocument/2006/relationships" xmlns:p="http://schemas.openxmlformats.org/presentationml/2006/main">
+  <p:cSld>
+    <p:spTree>
+      <p:nvGrpSpPr>
+        <p:cNvPr id="1" name=""/>
+        <p:cNvGrpSpPr/>
+        <p:nvPr/>
+      </p:nvGrpSpPr>
+      <p:grpSpPr>
+        <a:xfrm>
+          <a:off x="0" y="0"/>
+          <a:ext cx="0" cy="0"/>
+          <a:chOff x="0" y="0"/>
+          <a:chExt cx="0" cy="0"/>
+        </a:xfrm>
+      </p:grpSpPr>
+      <p:sp>
+        <p:nvSpPr>
+          <p:cNvPr id="2" name="Заголовок 1">
+            <a:extLst>
+              <a:ext uri="{FF2B5EF4-FFF2-40B4-BE49-F238E27FC236}">
+                <a16:creationId xmlns:a16="http://schemas.microsoft.com/office/drawing/2014/main" id="{526A0174-2A72-4A3A-BB30-251BFA696F5A}"/>
+              </a:ext>
+            </a:extLst>
+          </p:cNvPr>
+          <p:cNvSpPr>
+            <a:spLocks noGrp="1"/>
+          </p:cNvSpPr>
+          <p:nvPr>
+            <p:ph type="title"/>
+          </p:nvPr>
+        </p:nvSpPr>
+        <p:spPr/>
+        <p:txBody>
+          <a:bodyPr>
+            <a:normAutofit/>
+          </a:bodyPr>
+          <a:lstStyle/>
+          <a:p>
+            <a:r>
+              <a:rPr lang="ru-RU" sz="3800" dirty="0">
+                <a:highlight>
+                  <a:schemeClr val="lt2"/>
+                </a:highlight>
+              </a:rPr>
+              <a:t>Игровой процесс</a:t>
+            </a:r>
+          </a:p>
+        </p:txBody>
+      </p:sp>
+      <p:sp>
+        <p:nvSpPr>
+          <p:cNvPr id="3" name="Текст 2">
+            <a:extLst>
+              <a:ext uri="{FF2B5EF4-FFF2-40B4-BE49-F238E27FC236}">
+                <a16:creationId xmlns:a16="http://schemas.microsoft.com/office/drawing/2014/main" id="{A3E9BAD7-0AAC-43CA-A607-2071F49430FA}"/>
+              </a:ext>
+            </a:extLst>
+          </p:cNvPr>
+          <p:cNvSpPr>
+            <a:spLocks noGrp="1"/>
+          </p:cNvSpPr>
+          <p:nvPr>
+            <p:ph type="body" idx="1"/>
+          </p:nvPr>
+        </p:nvSpPr>
+        <p:spPr/>
+        <p:txBody>
+          <a:bodyPr/>
+          <a:lstStyle/>
+          <a:p>
+            <a:endParaRPr lang="ru-RU" dirty="0"/>
+          </a:p>
+        </p:txBody>
+      </p:sp>
+    </p:spTree>
+    <p:extLst>
+      <p:ext uri="{BB962C8B-B14F-4D97-AF65-F5344CB8AC3E}">
+        <p14:creationId xmlns:p14="http://schemas.microsoft.com/office/powerpoint/2010/main" val="3783075953"/>
+      </p:ext>
+    </p:extLst>
+  </p:cSld>
+  <p:clrMapOvr>
+    <a:masterClrMapping/>
+  </p:clrMapOvr>
+</p:sld>
+</file>
+
+<file path=ppt/slides/slide7.xml><?xml version="1.0" encoding="utf-8"?>
 <p:sld xmlns:a="http://schemas.openxmlformats.org/drawingml/2006/main" xmlns:r="http://schemas.openxmlformats.org/officeDocument/2006/relationships" xmlns:p="http://schemas.openxmlformats.org/presentationml/2006/main">
   <p:cSld>
     <p:spTree>
@@ -8236,14 +8472,36 @@
               <a:buNone/>
             </a:pPr>
             <a:r>
-              <a:rPr lang="ru" sz="1500">
+              <a:rPr lang="ru" sz="1500" dirty="0">
                 <a:solidFill>
                   <a:schemeClr val="accent1"/>
                 </a:solidFill>
               </a:rPr>
               <a:t>Возможности по доработке:</a:t>
             </a:r>
-            <a:endParaRPr sz="1500">
+          </a:p>
+          <a:p>
+            <a:pPr marL="0" lvl="0" indent="450215" algn="just" rtl="0">
+              <a:lnSpc>
+                <a:spcPct val="150000"/>
+              </a:lnSpc>
+              <a:spcBef>
+                <a:spcPts val="1200"/>
+              </a:spcBef>
+              <a:spcAft>
+                <a:spcPts val="0"/>
+              </a:spcAft>
+              <a:buNone/>
+            </a:pPr>
+            <a:r>
+              <a:rPr lang="ru" sz="1500" dirty="0">
+                <a:solidFill>
+                  <a:schemeClr val="accent1"/>
+                </a:solidFill>
+              </a:rPr>
+              <a:t>- добавление игры против нейронной сети</a:t>
+            </a:r>
+            <a:endParaRPr sz="1500" dirty="0">
               <a:solidFill>
                 <a:schemeClr val="accent1"/>
               </a:solidFill>
@@ -8262,7 +8520,7 @@
               </a:spcAft>
               <a:buNone/>
             </a:pPr>
-            <a:endParaRPr sz="1500">
+            <a:endParaRPr sz="1500" dirty="0">
               <a:solidFill>
                 <a:schemeClr val="accent1"/>
               </a:solidFill>
@@ -8282,7 +8540,7 @@
               <a:buNone/>
             </a:pPr>
             <a:r>
-              <a:rPr lang="ru" sz="1400">
+              <a:rPr lang="ru" sz="1400" dirty="0">
                 <a:solidFill>
                   <a:srgbClr val="000000"/>
                 </a:solidFill>
@@ -8293,7 +8551,7 @@
               </a:rPr>
               <a:t>          </a:t>
             </a:r>
-            <a:endParaRPr sz="1400">
+            <a:endParaRPr sz="1400" dirty="0">
               <a:solidFill>
                 <a:srgbClr val="000000"/>
               </a:solidFill>
@@ -8317,14 +8575,14 @@
               <a:buNone/>
             </a:pPr>
             <a:r>
-              <a:rPr lang="ru" sz="1500">
+              <a:rPr lang="ru" sz="1500" dirty="0">
                 <a:solidFill>
                   <a:schemeClr val="accent1"/>
                 </a:solidFill>
               </a:rPr>
               <a:t>    </a:t>
             </a:r>
-            <a:endParaRPr sz="1500">
+            <a:endParaRPr sz="1500" dirty="0">
               <a:solidFill>
                 <a:schemeClr val="accent1"/>
               </a:solidFill>
@@ -8343,7 +8601,7 @@
               </a:spcAft>
               <a:buNone/>
             </a:pPr>
-            <a:endParaRPr sz="1500">
+            <a:endParaRPr sz="1500" dirty="0">
               <a:solidFill>
                 <a:schemeClr val="accent1"/>
               </a:solidFill>
@@ -8359,7 +8617,7 @@
 </p:sld>
 </file>
 
-<file path=ppt/slides/slide7.xml><?xml version="1.0" encoding="utf-8"?>
+<file path=ppt/slides/slide8.xml><?xml version="1.0" encoding="utf-8"?>
 <p:sld xmlns:a="http://schemas.openxmlformats.org/drawingml/2006/main" xmlns:r="http://schemas.openxmlformats.org/officeDocument/2006/relationships" xmlns:p="http://schemas.openxmlformats.org/presentationml/2006/main">
   <p:cSld>
     <p:bg>

</xml_diff>